<commit_message>
Strings,Arrays and List notes with programs added
</commit_message>
<xml_diff>
--- a/3.Functions/Functions.pptx
+++ b/3.Functions/Functions.pptx
@@ -110,6 +110,11 @@
       </a:defRPr>
     </a:lvl9pPr>
   </p:defaultTextStyle>
+  <p:extLst>
+    <p:ext uri="{EFAFB233-063F-42B5-8137-9DF3F51BA10A}">
+      <p15:sldGuideLst xmlns:p15="http://schemas.microsoft.com/office/powerpoint/2012/main"/>
+    </p:ext>
+  </p:extLst>
 </p:presentation>
 </file>
 
@@ -339,7 +344,7 @@
           <a:p>
             <a:fld id="{44611939-60B5-4F51-BB78-41051B21CE5B}" type="datetimeFigureOut">
               <a:rPr lang="en-CA" smtClean="0"/>
-              <a:t>2021-05-07</a:t>
+              <a:t>2021-05-10</a:t>
             </a:fld>
             <a:endParaRPr lang="en-CA"/>
           </a:p>
@@ -547,7 +552,7 @@
           <a:p>
             <a:fld id="{44611939-60B5-4F51-BB78-41051B21CE5B}" type="datetimeFigureOut">
               <a:rPr lang="en-CA" smtClean="0"/>
-              <a:t>2021-05-07</a:t>
+              <a:t>2021-05-10</a:t>
             </a:fld>
             <a:endParaRPr lang="en-CA"/>
           </a:p>
@@ -803,7 +808,7 @@
           <a:p>
             <a:fld id="{44611939-60B5-4F51-BB78-41051B21CE5B}" type="datetimeFigureOut">
               <a:rPr lang="en-CA" smtClean="0"/>
-              <a:t>2021-05-07</a:t>
+              <a:t>2021-05-10</a:t>
             </a:fld>
             <a:endParaRPr lang="en-CA"/>
           </a:p>
@@ -973,7 +978,7 @@
           <a:p>
             <a:fld id="{44611939-60B5-4F51-BB78-41051B21CE5B}" type="datetimeFigureOut">
               <a:rPr lang="en-CA" smtClean="0"/>
-              <a:t>2021-05-07</a:t>
+              <a:t>2021-05-10</a:t>
             </a:fld>
             <a:endParaRPr lang="en-CA"/>
           </a:p>
@@ -1316,7 +1321,7 @@
           <a:p>
             <a:fld id="{44611939-60B5-4F51-BB78-41051B21CE5B}" type="datetimeFigureOut">
               <a:rPr lang="en-CA" smtClean="0"/>
-              <a:t>2021-05-07</a:t>
+              <a:t>2021-05-10</a:t>
             </a:fld>
             <a:endParaRPr lang="en-CA"/>
           </a:p>
@@ -1591,7 +1596,7 @@
           <a:p>
             <a:fld id="{44611939-60B5-4F51-BB78-41051B21CE5B}" type="datetimeFigureOut">
               <a:rPr lang="en-CA" smtClean="0"/>
-              <a:t>2021-05-07</a:t>
+              <a:t>2021-05-10</a:t>
             </a:fld>
             <a:endParaRPr lang="en-CA"/>
           </a:p>
@@ -1970,7 +1975,7 @@
           <a:p>
             <a:fld id="{44611939-60B5-4F51-BB78-41051B21CE5B}" type="datetimeFigureOut">
               <a:rPr lang="en-CA" smtClean="0"/>
-              <a:t>2021-05-07</a:t>
+              <a:t>2021-05-10</a:t>
             </a:fld>
             <a:endParaRPr lang="en-CA"/>
           </a:p>
@@ -2088,7 +2093,7 @@
           <a:p>
             <a:fld id="{44611939-60B5-4F51-BB78-41051B21CE5B}" type="datetimeFigureOut">
               <a:rPr lang="en-CA" smtClean="0"/>
-              <a:t>2021-05-07</a:t>
+              <a:t>2021-05-10</a:t>
             </a:fld>
             <a:endParaRPr lang="en-CA"/>
           </a:p>
@@ -2259,7 +2264,7 @@
           <a:p>
             <a:fld id="{44611939-60B5-4F51-BB78-41051B21CE5B}" type="datetimeFigureOut">
               <a:rPr lang="en-CA" smtClean="0"/>
-              <a:t>2021-05-07</a:t>
+              <a:t>2021-05-10</a:t>
             </a:fld>
             <a:endParaRPr lang="en-CA"/>
           </a:p>
@@ -2613,7 +2618,7 @@
           <a:p>
             <a:fld id="{44611939-60B5-4F51-BB78-41051B21CE5B}" type="datetimeFigureOut">
               <a:rPr lang="en-CA" smtClean="0"/>
-              <a:t>2021-05-07</a:t>
+              <a:t>2021-05-10</a:t>
             </a:fld>
             <a:endParaRPr lang="en-CA"/>
           </a:p>
@@ -2990,7 +2995,7 @@
           <a:p>
             <a:fld id="{44611939-60B5-4F51-BB78-41051B21CE5B}" type="datetimeFigureOut">
               <a:rPr lang="en-CA" smtClean="0"/>
-              <a:t>2021-05-07</a:t>
+              <a:t>2021-05-10</a:t>
             </a:fld>
             <a:endParaRPr lang="en-CA"/>
           </a:p>
@@ -3277,7 +3282,7 @@
           <a:p>
             <a:fld id="{44611939-60B5-4F51-BB78-41051B21CE5B}" type="datetimeFigureOut">
               <a:rPr lang="en-CA" smtClean="0"/>
-              <a:t>2021-05-07</a:t>
+              <a:t>2021-05-10</a:t>
             </a:fld>
             <a:endParaRPr lang="en-CA"/>
           </a:p>
@@ -5198,7 +5203,7 @@
         <p:spPr/>
         <p:txBody>
           <a:bodyPr>
-            <a:normAutofit fontScale="40000" lnSpcReduction="20000"/>
+            <a:noAutofit/>
           </a:bodyPr>
           <a:lstStyle/>
           <a:p>
@@ -5207,7 +5212,7 @@
               <a:buAutoNum type="arabicPeriod"/>
             </a:pPr>
             <a:r>
-              <a:rPr lang="en-US" dirty="0"/>
+              <a:rPr lang="en-US" sz="1200" dirty="0"/>
               <a:t>Write a C program to find cube of any number using function.</a:t>
             </a:r>
           </a:p>
@@ -5217,7 +5222,7 @@
               <a:buAutoNum type="arabicPeriod"/>
             </a:pPr>
             <a:r>
-              <a:rPr lang="en-US" dirty="0"/>
+              <a:rPr lang="en-US" sz="1200" dirty="0"/>
               <a:t>Write a C program to find diameter, circumference and area of circle using functions.</a:t>
             </a:r>
           </a:p>
@@ -5227,7 +5232,7 @@
               <a:buAutoNum type="arabicPeriod"/>
             </a:pPr>
             <a:r>
-              <a:rPr lang="en-US" dirty="0"/>
+              <a:rPr lang="en-US" sz="1200" dirty="0"/>
               <a:t>Write a C program to find maximum and minimum between two numbers using functions.</a:t>
             </a:r>
           </a:p>
@@ -5237,7 +5242,7 @@
               <a:buAutoNum type="arabicPeriod"/>
             </a:pPr>
             <a:r>
-              <a:rPr lang="en-US" dirty="0"/>
+              <a:rPr lang="en-US" sz="1200" dirty="0"/>
               <a:t>Write a C program to check whether a number is even or odd using functions.</a:t>
             </a:r>
           </a:p>
@@ -5247,7 +5252,7 @@
               <a:buAutoNum type="arabicPeriod"/>
             </a:pPr>
             <a:r>
-              <a:rPr lang="en-US" dirty="0"/>
+              <a:rPr lang="en-US" sz="1200" dirty="0"/>
               <a:t>Write a C program to check whether a number is prime, Armstrong or perfect number using functions.</a:t>
             </a:r>
           </a:p>
@@ -5257,8 +5262,8 @@
               <a:buAutoNum type="arabicPeriod"/>
             </a:pPr>
             <a:r>
-              <a:rPr lang="en-US" dirty="0"/>
-              <a:t> </a:t>
+              <a:rPr lang="en-US" sz="1200" dirty="0"/>
+              <a:t>Write a C program to find all prime numbers between given interval using functions.</a:t>
             </a:r>
           </a:p>
           <a:p>
@@ -5267,8 +5272,8 @@
               <a:buAutoNum type="arabicPeriod"/>
             </a:pPr>
             <a:r>
-              <a:rPr lang="en-US" dirty="0"/>
-              <a:t>Write a C program to find all prime numbers between given interval using functions.</a:t>
+              <a:rPr lang="en-US" sz="1200" dirty="0"/>
+              <a:t>Write a C program to print all strong numbers between given interval using functions.</a:t>
             </a:r>
           </a:p>
           <a:p>
@@ -5277,8 +5282,8 @@
               <a:buAutoNum type="arabicPeriod"/>
             </a:pPr>
             <a:r>
-              <a:rPr lang="en-US" dirty="0"/>
-              <a:t>Write a C program to print all strong numbers between given interval using functions.</a:t>
+              <a:rPr lang="en-US" sz="1200" dirty="0"/>
+              <a:t>Write a C program to print all Armstrong numbers between given interval using functions.</a:t>
             </a:r>
           </a:p>
           <a:p>
@@ -5287,8 +5292,8 @@
               <a:buAutoNum type="arabicPeriod"/>
             </a:pPr>
             <a:r>
-              <a:rPr lang="en-US" dirty="0"/>
-              <a:t>Write a C program to print all Armstrong numbers between given interval using functions.</a:t>
+              <a:rPr lang="en-US" sz="1200" dirty="0"/>
+              <a:t>Write a C program to print all perfect numbers between given interval using functions.</a:t>
             </a:r>
           </a:p>
           <a:p>
@@ -5297,8 +5302,8 @@
               <a:buAutoNum type="arabicPeriod"/>
             </a:pPr>
             <a:r>
-              <a:rPr lang="en-US" dirty="0"/>
-              <a:t>Write a C program to print all perfect numbers between given interval using functions.</a:t>
+              <a:rPr lang="en-US" sz="1200" dirty="0"/>
+              <a:t> </a:t>
             </a:r>
           </a:p>
           <a:p>
@@ -5306,46 +5311,7 @@
               <a:buFont typeface="+mj-lt"/>
               <a:buAutoNum type="arabicPeriod"/>
             </a:pPr>
-            <a:r>
-              <a:rPr lang="en-US" dirty="0"/>
-              <a:t> </a:t>
-            </a:r>
-          </a:p>
-          <a:p>
-            <a:pPr marL="457200" indent="-457200">
-              <a:buFont typeface="+mj-lt"/>
-              <a:buAutoNum type="arabicPeriod"/>
-            </a:pPr>
-            <a:r>
-              <a:rPr lang="en-US" dirty="0"/>
-              <a:t>Write a C program to find power of any number using recursion.</a:t>
-            </a:r>
-          </a:p>
-          <a:p>
-            <a:pPr marL="457200" indent="-457200">
-              <a:buFont typeface="+mj-lt"/>
-              <a:buAutoNum type="arabicPeriod"/>
-            </a:pPr>
-            <a:r>
-              <a:rPr lang="en-US" dirty="0"/>
-              <a:t>Write a C program to print all natural numbers between 1 to n using recursion.</a:t>
-            </a:r>
-          </a:p>
-          <a:p>
-            <a:pPr marL="457200" indent="-457200">
-              <a:buFont typeface="+mj-lt"/>
-              <a:buAutoNum type="arabicPeriod"/>
-            </a:pPr>
-            <a:r>
-              <a:rPr lang="en-US" dirty="0"/>
-              <a:t>Write a C program to print all even or odd numbers in given range using recursion.</a:t>
-            </a:r>
-          </a:p>
-          <a:p>
-            <a:r>
-              <a:rPr lang="en-US" dirty="0"/>
-              <a:t>.</a:t>
-            </a:r>
+            <a:endParaRPr lang="en-US" sz="1200" dirty="0"/>
           </a:p>
         </p:txBody>
       </p:sp>
@@ -5368,7 +5334,7 @@
         <p:spPr/>
         <p:txBody>
           <a:bodyPr>
-            <a:normAutofit fontScale="40000" lnSpcReduction="20000"/>
+            <a:normAutofit fontScale="25000" lnSpcReduction="20000"/>
           </a:bodyPr>
           <a:lstStyle/>
           <a:p>
@@ -5377,7 +5343,7 @@
               <a:buAutoNum type="arabicPeriod"/>
             </a:pPr>
             <a:r>
-              <a:rPr lang="en-US" dirty="0"/>
+              <a:rPr lang="en-US" sz="4400" dirty="0"/>
               <a:t>Write a C program to find sum of digits of a given number using recursion.</a:t>
             </a:r>
           </a:p>
@@ -5387,7 +5353,7 @@
               <a:buAutoNum type="arabicPeriod"/>
             </a:pPr>
             <a:r>
-              <a:rPr lang="en-US" dirty="0"/>
+              <a:rPr lang="en-US" sz="4400" dirty="0"/>
               <a:t>Write a C program to find factorial of any number using recursion.</a:t>
             </a:r>
           </a:p>
@@ -5397,7 +5363,7 @@
               <a:buAutoNum type="arabicPeriod"/>
             </a:pPr>
             <a:r>
-              <a:rPr lang="en-US" dirty="0"/>
+              <a:rPr lang="en-US" sz="4400" dirty="0"/>
               <a:t>Write a C program to generate nth Fibonacci term using recursion.</a:t>
             </a:r>
           </a:p>
@@ -5407,7 +5373,7 @@
               <a:buAutoNum type="arabicPeriod"/>
             </a:pPr>
             <a:r>
-              <a:rPr lang="en-US" dirty="0"/>
+              <a:rPr lang="en-US" sz="4400" dirty="0"/>
               <a:t>Write a C program to find GCD (HCF) of two numbers using recursion.</a:t>
             </a:r>
           </a:p>
@@ -5417,7 +5383,7 @@
               <a:buAutoNum type="arabicPeriod"/>
             </a:pPr>
             <a:r>
-              <a:rPr lang="en-US" dirty="0"/>
+              <a:rPr lang="en-US" sz="4400" dirty="0"/>
               <a:t>Write a C program to find LCM of two numbers using recursion.</a:t>
             </a:r>
           </a:p>
@@ -5427,7 +5393,7 @@
               <a:buAutoNum type="arabicPeriod"/>
             </a:pPr>
             <a:r>
-              <a:rPr lang="en-US" dirty="0"/>
+              <a:rPr lang="en-US" sz="4400" dirty="0"/>
               <a:t> </a:t>
             </a:r>
           </a:p>
@@ -5437,7 +5403,7 @@
               <a:buAutoNum type="arabicPeriod"/>
             </a:pPr>
             <a:r>
-              <a:rPr lang="en-US" dirty="0"/>
+              <a:rPr lang="en-US" sz="4400" dirty="0"/>
               <a:t>Write a C program to display all array elements using recursion.</a:t>
             </a:r>
           </a:p>
@@ -5447,7 +5413,7 @@
               <a:buAutoNum type="arabicPeriod"/>
             </a:pPr>
             <a:r>
-              <a:rPr lang="en-US" dirty="0"/>
+              <a:rPr lang="en-US" sz="4400" dirty="0"/>
               <a:t>Write a C program to find sum of elements of array using recursion.</a:t>
             </a:r>
           </a:p>
@@ -5457,7 +5423,7 @@
               <a:buAutoNum type="arabicPeriod"/>
             </a:pPr>
             <a:r>
-              <a:rPr lang="en-US" dirty="0"/>
+              <a:rPr lang="en-US" sz="4400" dirty="0"/>
               <a:t>Write a C program to find maximum and minimum elements in array using recursion.</a:t>
             </a:r>
           </a:p>
@@ -5467,7 +5433,7 @@
               <a:buAutoNum type="arabicPeriod"/>
             </a:pPr>
             <a:r>
-              <a:rPr lang="en-US" dirty="0"/>
+              <a:rPr lang="en-US" sz="4400" dirty="0"/>
               <a:t>Write a C program to find sum of all natural numbers between 1 to n using recursion.</a:t>
             </a:r>
           </a:p>
@@ -5477,7 +5443,7 @@
               <a:buAutoNum type="arabicPeriod"/>
             </a:pPr>
             <a:r>
-              <a:rPr lang="en-US" dirty="0"/>
+              <a:rPr lang="en-US" sz="4400" dirty="0"/>
               <a:t>Write a C program to find sum of all even or odd numbers in given range using recursion.</a:t>
             </a:r>
           </a:p>
@@ -5487,7 +5453,7 @@
               <a:buAutoNum type="arabicPeriod"/>
             </a:pPr>
             <a:r>
-              <a:rPr lang="en-US" dirty="0"/>
+              <a:rPr lang="en-US" sz="4400" dirty="0"/>
               <a:t>Write a C program to find reverse of any number using recursion.</a:t>
             </a:r>
           </a:p>
@@ -5497,10 +5463,10 @@
               <a:buAutoNum type="arabicPeriod"/>
             </a:pPr>
             <a:r>
-              <a:rPr lang="en-US" dirty="0"/>
+              <a:rPr lang="en-US" sz="4400" dirty="0"/>
               <a:t>Write a C program to check whether a number is palindrome or not using recursion</a:t>
             </a:r>
-            <a:endParaRPr lang="en-CA" dirty="0"/>
+            <a:endParaRPr lang="en-CA" sz="4400" dirty="0"/>
           </a:p>
           <a:p>
             <a:endParaRPr lang="en-CA" dirty="0"/>
@@ -5581,69 +5547,102 @@
         <p:spPr/>
         <p:txBody>
           <a:bodyPr>
-            <a:normAutofit fontScale="55000" lnSpcReduction="20000"/>
+            <a:normAutofit fontScale="25000" lnSpcReduction="20000"/>
           </a:bodyPr>
           <a:lstStyle/>
           <a:p>
             <a:r>
               <a:rPr lang="en-US" dirty="0"/>
-              <a:t>1. Write a program to add, subtract, multiply and divide two integers using user-defined type function with return type.</a:t>
-            </a:r>
-          </a:p>
-          <a:p>
-            <a:r>
-              <a:rPr lang="en-US" dirty="0"/>
+              <a:t>1</a:t>
+            </a:r>
+            <a:r>
+              <a:rPr lang="en-US" sz="4000" dirty="0"/>
+              <a:t>. Write a program to add, subtract, multiply and divide two integers using user-defined type function with return type.</a:t>
+            </a:r>
+          </a:p>
+          <a:p>
+            <a:r>
+              <a:rPr lang="en-US" sz="4000" dirty="0"/>
               <a:t>2. Write a program to calculate sum of first 20 natural numbers using recursive function.</a:t>
             </a:r>
           </a:p>
           <a:p>
             <a:r>
-              <a:rPr lang="en-US" dirty="0"/>
+              <a:rPr lang="en-US" sz="4000" dirty="0"/>
               <a:t>3. Write a program to generate Fibonacci series using recursive function.</a:t>
             </a:r>
           </a:p>
           <a:p>
             <a:r>
-              <a:rPr lang="en-US" dirty="0"/>
+              <a:rPr lang="en-US" sz="4000" dirty="0"/>
               <a:t>4. Write a program to swap two integers using call by value and call by reference methods of passing arguments to a function.</a:t>
             </a:r>
           </a:p>
           <a:p>
             <a:r>
-              <a:rPr lang="en-US" dirty="0"/>
+              <a:rPr lang="en-US" sz="4000" dirty="0"/>
               <a:t>5. Write a program to find sum of digits of the number using Recursive Function.</a:t>
             </a:r>
           </a:p>
           <a:p>
             <a:r>
-              <a:rPr lang="en-US" dirty="0"/>
+              <a:rPr lang="en-US" sz="4000" dirty="0"/>
               <a:t>6. Write a program to read an integer number and print the reverse of that number using recursion.</a:t>
             </a:r>
           </a:p>
           <a:p>
             <a:r>
-              <a:rPr lang="en-US" dirty="0"/>
+              <a:rPr lang="en-US" sz="4000" dirty="0"/>
               <a:t>7. Write a C program to find maximum and minimum between two numbers using functions.</a:t>
             </a:r>
           </a:p>
           <a:p>
             <a:r>
-              <a:rPr lang="en-US" dirty="0"/>
+              <a:rPr lang="en-US" sz="4000" dirty="0"/>
               <a:t>8. Write a C program to check whether a number is even or odd using functions.</a:t>
             </a:r>
           </a:p>
           <a:p>
             <a:r>
-              <a:rPr lang="en-US" dirty="0"/>
+              <a:rPr lang="en-US" sz="4000" dirty="0"/>
               <a:t>9. Write a C program to check whether a number is prime, Armstrong or perfect number using functions.</a:t>
             </a:r>
           </a:p>
           <a:p>
             <a:r>
-              <a:rPr lang="en-US" dirty="0"/>
+              <a:rPr lang="en-US" sz="4000" dirty="0"/>
               <a:t>10. Write a C program to find power of any number using recursion.</a:t>
             </a:r>
-            <a:endParaRPr lang="en-CA" dirty="0"/>
+          </a:p>
+          <a:p>
+            <a:pPr marL="457200" indent="-457200">
+              <a:buFont typeface="+mj-lt"/>
+              <a:buAutoNum type="arabicPeriod"/>
+            </a:pPr>
+            <a:r>
+              <a:rPr lang="en-US" sz="4000" dirty="0"/>
+              <a:t>Write a C program to find power of any number using recursion.</a:t>
+            </a:r>
+          </a:p>
+          <a:p>
+            <a:pPr marL="457200" indent="-457200">
+              <a:buFont typeface="+mj-lt"/>
+              <a:buAutoNum type="arabicPeriod"/>
+            </a:pPr>
+            <a:r>
+              <a:rPr lang="en-US" sz="4000" dirty="0"/>
+              <a:t>Write a C program to print all natural numbers between 1 to n using recursion.</a:t>
+            </a:r>
+          </a:p>
+          <a:p>
+            <a:pPr marL="457200" indent="-457200">
+              <a:buFont typeface="+mj-lt"/>
+              <a:buAutoNum type="arabicPeriod"/>
+            </a:pPr>
+            <a:r>
+              <a:rPr lang="en-US" sz="4000" dirty="0"/>
+              <a:t>Write a C program to print all even or odd numbers in given range using recursion.</a:t>
+            </a:r>
           </a:p>
         </p:txBody>
       </p:sp>
@@ -5666,11 +5665,192 @@
         <p:spPr/>
         <p:txBody>
           <a:bodyPr>
-            <a:normAutofit fontScale="55000" lnSpcReduction="20000"/>
+            <a:normAutofit fontScale="25000" lnSpcReduction="20000"/>
           </a:bodyPr>
           <a:lstStyle/>
           <a:p>
-            <a:endParaRPr lang="en-CA"/>
+            <a:r>
+              <a:rPr lang="en-US" sz="4000" dirty="0"/>
+              <a:t>.Recursion</a:t>
+            </a:r>
+          </a:p>
+          <a:p>
+            <a:pPr algn="l">
+              <a:buFont typeface="Arial" panose="020B0604020202020204" pitchFamily="34" charset="0"/>
+              <a:buChar char="•"/>
+            </a:pPr>
+            <a:r>
+              <a:rPr lang="en-US" sz="4000" b="0" i="0" u="none" strike="noStrike" dirty="0">
+                <a:solidFill>
+                  <a:srgbClr val="777777"/>
+                </a:solidFill>
+                <a:effectLst/>
+              </a:rPr>
+              <a:t>Adding Two Numbers</a:t>
+            </a:r>
+            <a:endParaRPr lang="en-US" sz="4000" b="0" i="0" dirty="0">
+              <a:solidFill>
+                <a:srgbClr val="212529"/>
+              </a:solidFill>
+              <a:effectLst/>
+            </a:endParaRPr>
+          </a:p>
+          <a:p>
+            <a:pPr>
+              <a:buFont typeface="Arial" panose="020B0604020202020204" pitchFamily="34" charset="0"/>
+              <a:buChar char="•"/>
+            </a:pPr>
+            <a:r>
+              <a:rPr lang="en-US" sz="4000" dirty="0">
+                <a:solidFill>
+                  <a:srgbClr val="777777"/>
+                </a:solidFill>
+              </a:rPr>
+              <a:t>Factorial</a:t>
+            </a:r>
+          </a:p>
+          <a:p>
+            <a:pPr>
+              <a:buFont typeface="Arial" panose="020B0604020202020204" pitchFamily="34" charset="0"/>
+              <a:buChar char="•"/>
+            </a:pPr>
+            <a:r>
+              <a:rPr lang="en-US" sz="4000" dirty="0">
+                <a:solidFill>
+                  <a:srgbClr val="777777"/>
+                </a:solidFill>
+              </a:rPr>
+              <a:t>Fibonacci Series</a:t>
+            </a:r>
+          </a:p>
+          <a:p>
+            <a:pPr>
+              <a:buFont typeface="Arial" panose="020B0604020202020204" pitchFamily="34" charset="0"/>
+              <a:buChar char="•"/>
+            </a:pPr>
+            <a:r>
+              <a:rPr lang="en-US" sz="4000" dirty="0">
+                <a:solidFill>
+                  <a:srgbClr val="777777"/>
+                </a:solidFill>
+              </a:rPr>
+              <a:t>Sum of First N Numbers</a:t>
+            </a:r>
+          </a:p>
+          <a:p>
+            <a:pPr>
+              <a:buFont typeface="Arial" panose="020B0604020202020204" pitchFamily="34" charset="0"/>
+              <a:buChar char="•"/>
+            </a:pPr>
+            <a:r>
+              <a:rPr lang="en-US" sz="4000" dirty="0">
+                <a:solidFill>
+                  <a:srgbClr val="777777"/>
+                </a:solidFill>
+              </a:rPr>
+              <a:t>Sum of Digits</a:t>
+            </a:r>
+          </a:p>
+          <a:p>
+            <a:pPr>
+              <a:buFont typeface="Arial" panose="020B0604020202020204" pitchFamily="34" charset="0"/>
+              <a:buChar char="•"/>
+            </a:pPr>
+            <a:r>
+              <a:rPr lang="en-US" sz="4000" dirty="0">
+                <a:solidFill>
+                  <a:srgbClr val="777777"/>
+                </a:solidFill>
+              </a:rPr>
+              <a:t>Palindrome</a:t>
+            </a:r>
+          </a:p>
+          <a:p>
+            <a:pPr>
+              <a:buFont typeface="Arial" panose="020B0604020202020204" pitchFamily="34" charset="0"/>
+              <a:buChar char="•"/>
+            </a:pPr>
+            <a:r>
+              <a:rPr lang="en-US" sz="4000" dirty="0">
+                <a:solidFill>
+                  <a:srgbClr val="777777"/>
+                </a:solidFill>
+              </a:rPr>
+              <a:t>Power of N</a:t>
+            </a:r>
+          </a:p>
+          <a:p>
+            <a:pPr>
+              <a:buFont typeface="Arial" panose="020B0604020202020204" pitchFamily="34" charset="0"/>
+              <a:buChar char="•"/>
+            </a:pPr>
+            <a:r>
+              <a:rPr lang="en-US" sz="4000" dirty="0">
+                <a:solidFill>
+                  <a:srgbClr val="777777"/>
+                </a:solidFill>
+              </a:rPr>
+              <a:t>Largest Array Element</a:t>
+            </a:r>
+          </a:p>
+          <a:p>
+            <a:pPr>
+              <a:buFont typeface="Arial" panose="020B0604020202020204" pitchFamily="34" charset="0"/>
+              <a:buChar char="•"/>
+            </a:pPr>
+            <a:r>
+              <a:rPr lang="en-US" sz="4000" dirty="0">
+                <a:solidFill>
+                  <a:srgbClr val="777777"/>
+                </a:solidFill>
+              </a:rPr>
+              <a:t>Prime or Composite</a:t>
+            </a:r>
+          </a:p>
+          <a:p>
+            <a:pPr>
+              <a:buFont typeface="Arial" panose="020B0604020202020204" pitchFamily="34" charset="0"/>
+              <a:buChar char="•"/>
+            </a:pPr>
+            <a:r>
+              <a:rPr lang="en-US" sz="4000" dirty="0">
+                <a:solidFill>
+                  <a:srgbClr val="777777"/>
+                </a:solidFill>
+              </a:rPr>
+              <a:t>LCM of Two Numbers</a:t>
+            </a:r>
+          </a:p>
+          <a:p>
+            <a:pPr>
+              <a:buFont typeface="Arial" panose="020B0604020202020204" pitchFamily="34" charset="0"/>
+              <a:buChar char="•"/>
+            </a:pPr>
+            <a:r>
+              <a:rPr lang="en-US" sz="4000" dirty="0">
+                <a:solidFill>
+                  <a:srgbClr val="777777"/>
+                </a:solidFill>
+              </a:rPr>
+              <a:t>GCD of Two Numbers</a:t>
+            </a:r>
+          </a:p>
+          <a:p>
+            <a:pPr>
+              <a:buFont typeface="Arial" panose="020B0604020202020204" pitchFamily="34" charset="0"/>
+              <a:buChar char="•"/>
+            </a:pPr>
+            <a:r>
+              <a:rPr lang="en-US" sz="4000" dirty="0">
+                <a:solidFill>
+                  <a:srgbClr val="777777"/>
+                </a:solidFill>
+              </a:rPr>
+              <a:t>Reverse a String</a:t>
+            </a:r>
+          </a:p>
+          <a:p>
+            <a:endParaRPr lang="en-CA" dirty="0"/>
           </a:p>
         </p:txBody>
       </p:sp>

</xml_diff>

<commit_message>
Strings and Lists added
</commit_message>
<xml_diff>
--- a/3.Functions/Functions.pptx
+++ b/3.Functions/Functions.pptx
@@ -344,7 +344,7 @@
           <a:p>
             <a:fld id="{44611939-60B5-4F51-BB78-41051B21CE5B}" type="datetimeFigureOut">
               <a:rPr lang="en-CA" smtClean="0"/>
-              <a:t>2021-05-10</a:t>
+              <a:t>2021-05-14</a:t>
             </a:fld>
             <a:endParaRPr lang="en-CA"/>
           </a:p>
@@ -552,7 +552,7 @@
           <a:p>
             <a:fld id="{44611939-60B5-4F51-BB78-41051B21CE5B}" type="datetimeFigureOut">
               <a:rPr lang="en-CA" smtClean="0"/>
-              <a:t>2021-05-10</a:t>
+              <a:t>2021-05-14</a:t>
             </a:fld>
             <a:endParaRPr lang="en-CA"/>
           </a:p>
@@ -808,7 +808,7 @@
           <a:p>
             <a:fld id="{44611939-60B5-4F51-BB78-41051B21CE5B}" type="datetimeFigureOut">
               <a:rPr lang="en-CA" smtClean="0"/>
-              <a:t>2021-05-10</a:t>
+              <a:t>2021-05-14</a:t>
             </a:fld>
             <a:endParaRPr lang="en-CA"/>
           </a:p>
@@ -978,7 +978,7 @@
           <a:p>
             <a:fld id="{44611939-60B5-4F51-BB78-41051B21CE5B}" type="datetimeFigureOut">
               <a:rPr lang="en-CA" smtClean="0"/>
-              <a:t>2021-05-10</a:t>
+              <a:t>2021-05-14</a:t>
             </a:fld>
             <a:endParaRPr lang="en-CA"/>
           </a:p>
@@ -1321,7 +1321,7 @@
           <a:p>
             <a:fld id="{44611939-60B5-4F51-BB78-41051B21CE5B}" type="datetimeFigureOut">
               <a:rPr lang="en-CA" smtClean="0"/>
-              <a:t>2021-05-10</a:t>
+              <a:t>2021-05-14</a:t>
             </a:fld>
             <a:endParaRPr lang="en-CA"/>
           </a:p>
@@ -1596,7 +1596,7 @@
           <a:p>
             <a:fld id="{44611939-60B5-4F51-BB78-41051B21CE5B}" type="datetimeFigureOut">
               <a:rPr lang="en-CA" smtClean="0"/>
-              <a:t>2021-05-10</a:t>
+              <a:t>2021-05-14</a:t>
             </a:fld>
             <a:endParaRPr lang="en-CA"/>
           </a:p>
@@ -1975,7 +1975,7 @@
           <a:p>
             <a:fld id="{44611939-60B5-4F51-BB78-41051B21CE5B}" type="datetimeFigureOut">
               <a:rPr lang="en-CA" smtClean="0"/>
-              <a:t>2021-05-10</a:t>
+              <a:t>2021-05-14</a:t>
             </a:fld>
             <a:endParaRPr lang="en-CA"/>
           </a:p>
@@ -2093,7 +2093,7 @@
           <a:p>
             <a:fld id="{44611939-60B5-4F51-BB78-41051B21CE5B}" type="datetimeFigureOut">
               <a:rPr lang="en-CA" smtClean="0"/>
-              <a:t>2021-05-10</a:t>
+              <a:t>2021-05-14</a:t>
             </a:fld>
             <a:endParaRPr lang="en-CA"/>
           </a:p>
@@ -2264,7 +2264,7 @@
           <a:p>
             <a:fld id="{44611939-60B5-4F51-BB78-41051B21CE5B}" type="datetimeFigureOut">
               <a:rPr lang="en-CA" smtClean="0"/>
-              <a:t>2021-05-10</a:t>
+              <a:t>2021-05-14</a:t>
             </a:fld>
             <a:endParaRPr lang="en-CA"/>
           </a:p>
@@ -2618,7 +2618,7 @@
           <a:p>
             <a:fld id="{44611939-60B5-4F51-BB78-41051B21CE5B}" type="datetimeFigureOut">
               <a:rPr lang="en-CA" smtClean="0"/>
-              <a:t>2021-05-10</a:t>
+              <a:t>2021-05-14</a:t>
             </a:fld>
             <a:endParaRPr lang="en-CA"/>
           </a:p>
@@ -2995,7 +2995,7 @@
           <a:p>
             <a:fld id="{44611939-60B5-4F51-BB78-41051B21CE5B}" type="datetimeFigureOut">
               <a:rPr lang="en-CA" smtClean="0"/>
-              <a:t>2021-05-10</a:t>
+              <a:t>2021-05-14</a:t>
             </a:fld>
             <a:endParaRPr lang="en-CA"/>
           </a:p>
@@ -3282,7 +3282,7 @@
           <a:p>
             <a:fld id="{44611939-60B5-4F51-BB78-41051B21CE5B}" type="datetimeFigureOut">
               <a:rPr lang="en-CA" smtClean="0"/>
-              <a:t>2021-05-10</a:t>
+              <a:t>2021-05-14</a:t>
             </a:fld>
             <a:endParaRPr lang="en-CA"/>
           </a:p>
@@ -5180,7 +5180,10 @@
           <a:bodyPr/>
           <a:lstStyle/>
           <a:p>
-            <a:endParaRPr lang="en-CA"/>
+            <a:r>
+              <a:rPr lang="en-CA" dirty="0"/>
+              <a:t>Use Functions </a:t>
+            </a:r>
           </a:p>
         </p:txBody>
       </p:sp>
@@ -5213,7 +5216,7 @@
             </a:pPr>
             <a:r>
               <a:rPr lang="en-US" sz="1200" dirty="0"/>
-              <a:t>Write a C program to find cube of any number using function.</a:t>
+              <a:t>Find cube of any number </a:t>
             </a:r>
           </a:p>
           <a:p>
@@ -5223,7 +5226,7 @@
             </a:pPr>
             <a:r>
               <a:rPr lang="en-US" sz="1200" dirty="0"/>
-              <a:t>Write a C program to find diameter, circumference and area of circle using functions.</a:t>
+              <a:t>Find diameter, circumference and area of circle .</a:t>
             </a:r>
           </a:p>
           <a:p>
@@ -5233,7 +5236,7 @@
             </a:pPr>
             <a:r>
               <a:rPr lang="en-US" sz="1200" dirty="0"/>
-              <a:t>Write a C program to find maximum and minimum between two numbers using functions.</a:t>
+              <a:t>Find maximum and minimum between two numbers using functions.</a:t>
             </a:r>
           </a:p>
           <a:p>
@@ -5243,7 +5246,7 @@
             </a:pPr>
             <a:r>
               <a:rPr lang="en-US" sz="1200" dirty="0"/>
-              <a:t>Write a C program to check whether a number is even or odd using functions.</a:t>
+              <a:t>A number is even or odd using functions.</a:t>
             </a:r>
           </a:p>
           <a:p>
@@ -5252,8 +5255,12 @@
               <a:buAutoNum type="arabicPeriod"/>
             </a:pPr>
             <a:r>
+              <a:rPr lang="en-US" sz="1200" b="1" dirty="0"/>
+              <a:t>A number is prime, Armstrong or perfect number using functions</a:t>
+            </a:r>
+            <a:r>
               <a:rPr lang="en-US" sz="1200" dirty="0"/>
-              <a:t>Write a C program to check whether a number is prime, Armstrong or perfect number using functions.</a:t>
+              <a:t>.</a:t>
             </a:r>
           </a:p>
           <a:p>
@@ -5262,8 +5269,12 @@
               <a:buAutoNum type="arabicPeriod"/>
             </a:pPr>
             <a:r>
+              <a:rPr lang="en-US" sz="1200" b="1" dirty="0"/>
+              <a:t>All prime numbers between given interval using functions</a:t>
+            </a:r>
+            <a:r>
               <a:rPr lang="en-US" sz="1200" dirty="0"/>
-              <a:t>Write a C program to find all prime numbers between given interval using functions.</a:t>
+              <a:t>.</a:t>
             </a:r>
           </a:p>
           <a:p>
@@ -5272,8 +5283,8 @@
               <a:buAutoNum type="arabicPeriod"/>
             </a:pPr>
             <a:r>
-              <a:rPr lang="en-US" sz="1200" dirty="0"/>
-              <a:t>Write a C program to print all strong numbers between given interval using functions.</a:t>
+              <a:rPr lang="en-US" sz="1200" b="1" dirty="0"/>
+              <a:t>All strong numbers between given interval using functions.</a:t>
             </a:r>
           </a:p>
           <a:p>
@@ -5282,8 +5293,8 @@
               <a:buAutoNum type="arabicPeriod"/>
             </a:pPr>
             <a:r>
-              <a:rPr lang="en-US" sz="1200" dirty="0"/>
-              <a:t>Write a C program to print all Armstrong numbers between given interval using functions.</a:t>
+              <a:rPr lang="en-US" sz="1200" b="1" dirty="0"/>
+              <a:t>All Armstrong numbers between given interval using functions.</a:t>
             </a:r>
           </a:p>
           <a:p>
@@ -5292,19 +5303,19 @@
               <a:buAutoNum type="arabicPeriod"/>
             </a:pPr>
             <a:r>
+              <a:rPr lang="en-US" sz="1200" b="1" dirty="0"/>
+              <a:t>All perfect numbers between given interval using functions</a:t>
+            </a:r>
+            <a:r>
               <a:rPr lang="en-US" sz="1200" dirty="0"/>
-              <a:t>Write a C program to print all perfect numbers between given interval using functions.</a:t>
-            </a:r>
-          </a:p>
-          <a:p>
-            <a:pPr marL="457200" indent="-457200">
-              <a:buFont typeface="+mj-lt"/>
-              <a:buAutoNum type="arabicPeriod"/>
+              <a:t>.</a:t>
+            </a:r>
+          </a:p>
+          <a:p>
+            <a:pPr marL="0" indent="0">
+              <a:buNone/>
             </a:pPr>
-            <a:r>
-              <a:rPr lang="en-US" sz="1200" dirty="0"/>
-              <a:t> </a:t>
-            </a:r>
+            <a:endParaRPr lang="en-US" sz="1200" dirty="0"/>
           </a:p>
           <a:p>
             <a:pPr marL="457200" indent="-457200">
@@ -5334,140 +5345,9 @@
         <p:spPr/>
         <p:txBody>
           <a:bodyPr>
-            <a:normAutofit fontScale="25000" lnSpcReduction="20000"/>
+            <a:normAutofit/>
           </a:bodyPr>
           <a:lstStyle/>
-          <a:p>
-            <a:pPr marL="457200" indent="-457200">
-              <a:buFont typeface="+mj-lt"/>
-              <a:buAutoNum type="arabicPeriod"/>
-            </a:pPr>
-            <a:r>
-              <a:rPr lang="en-US" sz="4400" dirty="0"/>
-              <a:t>Write a C program to find sum of digits of a given number using recursion.</a:t>
-            </a:r>
-          </a:p>
-          <a:p>
-            <a:pPr marL="457200" indent="-457200">
-              <a:buFont typeface="+mj-lt"/>
-              <a:buAutoNum type="arabicPeriod"/>
-            </a:pPr>
-            <a:r>
-              <a:rPr lang="en-US" sz="4400" dirty="0"/>
-              <a:t>Write a C program to find factorial of any number using recursion.</a:t>
-            </a:r>
-          </a:p>
-          <a:p>
-            <a:pPr marL="457200" indent="-457200">
-              <a:buFont typeface="+mj-lt"/>
-              <a:buAutoNum type="arabicPeriod"/>
-            </a:pPr>
-            <a:r>
-              <a:rPr lang="en-US" sz="4400" dirty="0"/>
-              <a:t>Write a C program to generate nth Fibonacci term using recursion.</a:t>
-            </a:r>
-          </a:p>
-          <a:p>
-            <a:pPr marL="457200" indent="-457200">
-              <a:buFont typeface="+mj-lt"/>
-              <a:buAutoNum type="arabicPeriod"/>
-            </a:pPr>
-            <a:r>
-              <a:rPr lang="en-US" sz="4400" dirty="0"/>
-              <a:t>Write a C program to find GCD (HCF) of two numbers using recursion.</a:t>
-            </a:r>
-          </a:p>
-          <a:p>
-            <a:pPr marL="457200" indent="-457200">
-              <a:buFont typeface="+mj-lt"/>
-              <a:buAutoNum type="arabicPeriod"/>
-            </a:pPr>
-            <a:r>
-              <a:rPr lang="en-US" sz="4400" dirty="0"/>
-              <a:t>Write a C program to find LCM of two numbers using recursion.</a:t>
-            </a:r>
-          </a:p>
-          <a:p>
-            <a:pPr marL="457200" indent="-457200">
-              <a:buFont typeface="+mj-lt"/>
-              <a:buAutoNum type="arabicPeriod"/>
-            </a:pPr>
-            <a:r>
-              <a:rPr lang="en-US" sz="4400" dirty="0"/>
-              <a:t> </a:t>
-            </a:r>
-          </a:p>
-          <a:p>
-            <a:pPr marL="457200" indent="-457200">
-              <a:buFont typeface="+mj-lt"/>
-              <a:buAutoNum type="arabicPeriod"/>
-            </a:pPr>
-            <a:r>
-              <a:rPr lang="en-US" sz="4400" dirty="0"/>
-              <a:t>Write a C program to display all array elements using recursion.</a:t>
-            </a:r>
-          </a:p>
-          <a:p>
-            <a:pPr marL="457200" indent="-457200">
-              <a:buFont typeface="+mj-lt"/>
-              <a:buAutoNum type="arabicPeriod"/>
-            </a:pPr>
-            <a:r>
-              <a:rPr lang="en-US" sz="4400" dirty="0"/>
-              <a:t>Write a C program to find sum of elements of array using recursion.</a:t>
-            </a:r>
-          </a:p>
-          <a:p>
-            <a:pPr marL="457200" indent="-457200">
-              <a:buFont typeface="+mj-lt"/>
-              <a:buAutoNum type="arabicPeriod"/>
-            </a:pPr>
-            <a:r>
-              <a:rPr lang="en-US" sz="4400" dirty="0"/>
-              <a:t>Write a C program to find maximum and minimum elements in array using recursion.</a:t>
-            </a:r>
-          </a:p>
-          <a:p>
-            <a:pPr marL="457200" indent="-457200">
-              <a:buFont typeface="+mj-lt"/>
-              <a:buAutoNum type="arabicPeriod"/>
-            </a:pPr>
-            <a:r>
-              <a:rPr lang="en-US" sz="4400" dirty="0"/>
-              <a:t>Write a C program to find sum of all natural numbers between 1 to n using recursion.</a:t>
-            </a:r>
-          </a:p>
-          <a:p>
-            <a:pPr marL="457200" indent="-457200">
-              <a:buFont typeface="+mj-lt"/>
-              <a:buAutoNum type="arabicPeriod"/>
-            </a:pPr>
-            <a:r>
-              <a:rPr lang="en-US" sz="4400" dirty="0"/>
-              <a:t>Write a C program to find sum of all even or odd numbers in given range using recursion.</a:t>
-            </a:r>
-          </a:p>
-          <a:p>
-            <a:pPr marL="457200" indent="-457200">
-              <a:buFont typeface="+mj-lt"/>
-              <a:buAutoNum type="arabicPeriod"/>
-            </a:pPr>
-            <a:r>
-              <a:rPr lang="en-US" sz="4400" dirty="0"/>
-              <a:t>Write a C program to find reverse of any number using recursion.</a:t>
-            </a:r>
-          </a:p>
-          <a:p>
-            <a:pPr marL="457200" indent="-457200">
-              <a:buFont typeface="+mj-lt"/>
-              <a:buAutoNum type="arabicPeriod"/>
-            </a:pPr>
-            <a:r>
-              <a:rPr lang="en-US" sz="4400" dirty="0"/>
-              <a:t>Write a C program to check whether a number is palindrome or not using recursion</a:t>
-            </a:r>
-            <a:endParaRPr lang="en-CA" sz="4400" dirty="0"/>
-          </a:p>
           <a:p>
             <a:endParaRPr lang="en-CA" dirty="0"/>
           </a:p>
@@ -5521,10 +5401,25 @@
         </p:nvSpPr>
         <p:spPr/>
         <p:txBody>
-          <a:bodyPr/>
-          <a:lstStyle/>
-          <a:p>
-            <a:endParaRPr lang="en-CA"/>
+          <a:bodyPr>
+            <a:normAutofit fontScale="90000"/>
+          </a:bodyPr>
+          <a:lstStyle/>
+          <a:p>
+            <a:br>
+              <a:rPr lang="en-US" sz="4800" b="1" u="sng" dirty="0"/>
+            </a:br>
+            <a:br>
+              <a:rPr lang="en-US" sz="4800" b="1" u="sng" dirty="0"/>
+            </a:br>
+            <a:r>
+              <a:rPr lang="en-US" sz="4800" b="1" u="sng" dirty="0"/>
+              <a:t>Use Recursion</a:t>
+            </a:r>
+            <a:br>
+              <a:rPr lang="en-US" sz="4800" b="1" u="sng" dirty="0"/>
+            </a:br>
+            <a:endParaRPr lang="en-CA" dirty="0"/>
           </a:p>
         </p:txBody>
       </p:sp>
@@ -5547,102 +5442,149 @@
         <p:spPr/>
         <p:txBody>
           <a:bodyPr>
-            <a:normAutofit fontScale="25000" lnSpcReduction="20000"/>
+            <a:noAutofit/>
           </a:bodyPr>
           <a:lstStyle/>
           <a:p>
-            <a:r>
-              <a:rPr lang="en-US" dirty="0"/>
-              <a:t>1</a:t>
-            </a:r>
-            <a:r>
-              <a:rPr lang="en-US" sz="4000" dirty="0"/>
-              <a:t>. Write a program to add, subtract, multiply and divide two integers using user-defined type function with return type.</a:t>
-            </a:r>
-          </a:p>
-          <a:p>
-            <a:r>
-              <a:rPr lang="en-US" sz="4000" dirty="0"/>
-              <a:t>2. Write a program to calculate sum of first 20 natural numbers using recursive function.</a:t>
-            </a:r>
-          </a:p>
-          <a:p>
-            <a:r>
-              <a:rPr lang="en-US" sz="4000" dirty="0"/>
-              <a:t>3. Write a program to generate Fibonacci series using recursive function.</a:t>
-            </a:r>
-          </a:p>
-          <a:p>
-            <a:r>
-              <a:rPr lang="en-US" sz="4000" dirty="0"/>
-              <a:t>4. Write a program to swap two integers using call by value and call by reference methods of passing arguments to a function.</a:t>
-            </a:r>
-          </a:p>
-          <a:p>
-            <a:r>
-              <a:rPr lang="en-US" sz="4000" dirty="0"/>
-              <a:t>5. Write a program to find sum of digits of the number using Recursive Function.</a:t>
-            </a:r>
-          </a:p>
-          <a:p>
-            <a:r>
-              <a:rPr lang="en-US" sz="4000" dirty="0"/>
-              <a:t>6. Write a program to read an integer number and print the reverse of that number using recursion.</a:t>
-            </a:r>
-          </a:p>
-          <a:p>
-            <a:r>
-              <a:rPr lang="en-US" sz="4000" dirty="0"/>
-              <a:t>7. Write a C program to find maximum and minimum between two numbers using functions.</a:t>
-            </a:r>
-          </a:p>
-          <a:p>
-            <a:r>
-              <a:rPr lang="en-US" sz="4000" dirty="0"/>
-              <a:t>8. Write a C program to check whether a number is even or odd using functions.</a:t>
-            </a:r>
-          </a:p>
-          <a:p>
-            <a:r>
-              <a:rPr lang="en-US" sz="4000" dirty="0"/>
-              <a:t>9. Write a C program to check whether a number is prime, Armstrong or perfect number using functions.</a:t>
-            </a:r>
-          </a:p>
-          <a:p>
-            <a:r>
-              <a:rPr lang="en-US" sz="4000" dirty="0"/>
-              <a:t>10. Write a C program to find power of any number using recursion.</a:t>
-            </a:r>
-          </a:p>
-          <a:p>
-            <a:pPr marL="457200" indent="-457200">
+            <a:pPr marL="228600" indent="-228600">
+              <a:lnSpc>
+                <a:spcPct val="70000"/>
+              </a:lnSpc>
               <a:buFont typeface="+mj-lt"/>
               <a:buAutoNum type="arabicPeriod"/>
             </a:pPr>
             <a:r>
-              <a:rPr lang="en-US" sz="4000" dirty="0"/>
-              <a:t>Write a C program to find power of any number using recursion.</a:t>
-            </a:r>
-          </a:p>
-          <a:p>
-            <a:pPr marL="457200" indent="-457200">
+              <a:rPr lang="en-US" sz="1200" dirty="0"/>
+              <a:t>Find sum of digits of the number using Recursive Function.</a:t>
+            </a:r>
+          </a:p>
+          <a:p>
+            <a:pPr marL="228600" indent="-228600">
+              <a:lnSpc>
+                <a:spcPct val="70000"/>
+              </a:lnSpc>
               <a:buFont typeface="+mj-lt"/>
               <a:buAutoNum type="arabicPeriod"/>
             </a:pPr>
             <a:r>
-              <a:rPr lang="en-US" sz="4000" dirty="0"/>
-              <a:t>Write a C program to print all natural numbers between 1 to n using recursion.</a:t>
-            </a:r>
-          </a:p>
-          <a:p>
-            <a:pPr marL="457200" indent="-457200">
+              <a:rPr lang="en-US" sz="1200" dirty="0"/>
+              <a:t>Find power of any number using recursion.</a:t>
+            </a:r>
+          </a:p>
+          <a:p>
+            <a:pPr marL="228600" indent="-228600">
+              <a:lnSpc>
+                <a:spcPct val="70000"/>
+              </a:lnSpc>
               <a:buFont typeface="+mj-lt"/>
               <a:buAutoNum type="arabicPeriod"/>
             </a:pPr>
             <a:r>
-              <a:rPr lang="en-US" sz="4000" dirty="0"/>
-              <a:t>Write a C program to print all even or odd numbers in given range using recursion.</a:t>
-            </a:r>
+              <a:rPr lang="en-US" sz="1200" dirty="0"/>
+              <a:t>Print all natural numbers between 1 to n using recursion.</a:t>
+            </a:r>
+          </a:p>
+          <a:p>
+            <a:pPr marL="228600" indent="-228600">
+              <a:lnSpc>
+                <a:spcPct val="70000"/>
+              </a:lnSpc>
+              <a:buFont typeface="+mj-lt"/>
+              <a:buAutoNum type="arabicPeriod"/>
+            </a:pPr>
+            <a:r>
+              <a:rPr lang="en-US" sz="1200" dirty="0"/>
+              <a:t>Print all even or odd numbers in given range using recursion.</a:t>
+            </a:r>
+          </a:p>
+          <a:p>
+            <a:pPr marL="228600" indent="-228600">
+              <a:lnSpc>
+                <a:spcPct val="70000"/>
+              </a:lnSpc>
+              <a:buFont typeface="+mj-lt"/>
+              <a:buAutoNum type="arabicPeriod"/>
+            </a:pPr>
+            <a:r>
+              <a:rPr lang="en-US" sz="1200" dirty="0"/>
+              <a:t>Find sum of digits of a given number using recursion.</a:t>
+            </a:r>
+          </a:p>
+          <a:p>
+            <a:pPr marL="228600" indent="-228600">
+              <a:lnSpc>
+                <a:spcPct val="70000"/>
+              </a:lnSpc>
+              <a:buFont typeface="+mj-lt"/>
+              <a:buAutoNum type="arabicPeriod"/>
+            </a:pPr>
+            <a:r>
+              <a:rPr lang="en-US" sz="1200" dirty="0"/>
+              <a:t>Write a C program to find factorial of any number using recursion.</a:t>
+            </a:r>
+          </a:p>
+          <a:p>
+            <a:pPr marL="228600" indent="-228600">
+              <a:lnSpc>
+                <a:spcPct val="70000"/>
+              </a:lnSpc>
+              <a:buFont typeface="+mj-lt"/>
+              <a:buAutoNum type="arabicPeriod"/>
+            </a:pPr>
+            <a:r>
+              <a:rPr lang="en-US" sz="1200" dirty="0"/>
+              <a:t>Write a C program to generate nth Fibonacci term using recursion.</a:t>
+            </a:r>
+          </a:p>
+          <a:p>
+            <a:pPr marL="228600" indent="-228600">
+              <a:lnSpc>
+                <a:spcPct val="70000"/>
+              </a:lnSpc>
+              <a:buFont typeface="+mj-lt"/>
+              <a:buAutoNum type="arabicPeriod"/>
+            </a:pPr>
+            <a:r>
+              <a:rPr lang="en-US" sz="1200" dirty="0"/>
+              <a:t>Write a C program to find GCD (HCF) of two numbers using recursion.</a:t>
+            </a:r>
+          </a:p>
+          <a:p>
+            <a:pPr marL="228600" indent="-228600">
+              <a:lnSpc>
+                <a:spcPct val="70000"/>
+              </a:lnSpc>
+              <a:buFont typeface="+mj-lt"/>
+              <a:buAutoNum type="arabicPeriod"/>
+            </a:pPr>
+            <a:r>
+              <a:rPr lang="en-US" sz="1200" dirty="0"/>
+              <a:t>Write a C program to find LCM of two numbers using recursion. </a:t>
+            </a:r>
+          </a:p>
+          <a:p>
+            <a:pPr marL="228600" indent="-228600">
+              <a:lnSpc>
+                <a:spcPct val="70000"/>
+              </a:lnSpc>
+              <a:buFont typeface="+mj-lt"/>
+              <a:buAutoNum type="arabicPeriod"/>
+            </a:pPr>
+            <a:r>
+              <a:rPr lang="en-US" sz="1200" dirty="0"/>
+              <a:t>Write a C program to check whether a number is palindrome or not using recursion</a:t>
+            </a:r>
+            <a:endParaRPr lang="en-CA" sz="1200" dirty="0"/>
+          </a:p>
+          <a:p>
+            <a:pPr marL="914400" indent="-914400">
+              <a:lnSpc>
+                <a:spcPct val="70000"/>
+              </a:lnSpc>
+              <a:buFont typeface="+mj-lt"/>
+              <a:buAutoNum type="arabicPeriod"/>
+            </a:pPr>
+            <a:endParaRPr lang="en-US" sz="1200" dirty="0"/>
           </a:p>
         </p:txBody>
       </p:sp>
@@ -5665,189 +5607,84 @@
         <p:spPr/>
         <p:txBody>
           <a:bodyPr>
-            <a:normAutofit fontScale="25000" lnSpcReduction="20000"/>
+            <a:normAutofit/>
           </a:bodyPr>
           <a:lstStyle/>
           <a:p>
-            <a:r>
-              <a:rPr lang="en-US" sz="4000" dirty="0"/>
-              <a:t>.Recursion</a:t>
-            </a:r>
-          </a:p>
-          <a:p>
-            <a:pPr algn="l">
-              <a:buFont typeface="Arial" panose="020B0604020202020204" pitchFamily="34" charset="0"/>
-              <a:buChar char="•"/>
+            <a:pPr marL="457200" indent="-457200">
+              <a:buFont typeface="+mj-lt"/>
+              <a:buAutoNum type="arabicPeriod"/>
             </a:pPr>
             <a:r>
-              <a:rPr lang="en-US" sz="4000" b="0" i="0" u="none" strike="noStrike" dirty="0">
-                <a:solidFill>
-                  <a:srgbClr val="777777"/>
-                </a:solidFill>
-                <a:effectLst/>
-              </a:rPr>
-              <a:t>Adding Two Numbers</a:t>
-            </a:r>
-            <a:endParaRPr lang="en-US" sz="4000" b="0" i="0" dirty="0">
-              <a:solidFill>
-                <a:srgbClr val="212529"/>
-              </a:solidFill>
-              <a:effectLst/>
-            </a:endParaRPr>
-          </a:p>
-          <a:p>
-            <a:pPr>
-              <a:buFont typeface="Arial" panose="020B0604020202020204" pitchFamily="34" charset="0"/>
-              <a:buChar char="•"/>
+              <a:rPr lang="en-US" sz="1200" dirty="0"/>
+              <a:t>Write a C program to display all array elements using recursion.</a:t>
+            </a:r>
+          </a:p>
+          <a:p>
+            <a:pPr marL="457200" indent="-457200">
+              <a:buFont typeface="+mj-lt"/>
+              <a:buAutoNum type="arabicPeriod"/>
             </a:pPr>
             <a:r>
-              <a:rPr lang="en-US" sz="4000" dirty="0">
-                <a:solidFill>
-                  <a:srgbClr val="777777"/>
-                </a:solidFill>
-              </a:rPr>
-              <a:t>Factorial</a:t>
-            </a:r>
-          </a:p>
-          <a:p>
-            <a:pPr>
-              <a:buFont typeface="Arial" panose="020B0604020202020204" pitchFamily="34" charset="0"/>
-              <a:buChar char="•"/>
+              <a:rPr lang="en-US" sz="1200" dirty="0"/>
+              <a:t>Write a C program to find sum of elements of array using recursion.</a:t>
+            </a:r>
+          </a:p>
+          <a:p>
+            <a:pPr marL="457200" indent="-457200">
+              <a:buFont typeface="+mj-lt"/>
+              <a:buAutoNum type="arabicPeriod"/>
             </a:pPr>
             <a:r>
-              <a:rPr lang="en-US" sz="4000" dirty="0">
-                <a:solidFill>
-                  <a:srgbClr val="777777"/>
-                </a:solidFill>
-              </a:rPr>
-              <a:t>Fibonacci Series</a:t>
-            </a:r>
-          </a:p>
-          <a:p>
-            <a:pPr>
-              <a:buFont typeface="Arial" panose="020B0604020202020204" pitchFamily="34" charset="0"/>
-              <a:buChar char="•"/>
+              <a:rPr lang="en-US" sz="1200" dirty="0"/>
+              <a:t>Write a C program to find maximum and minimum elements in array using recursion.</a:t>
+            </a:r>
+          </a:p>
+          <a:p>
+            <a:pPr marL="457200" indent="-457200">
+              <a:buFont typeface="+mj-lt"/>
+              <a:buAutoNum type="arabicPeriod"/>
             </a:pPr>
             <a:r>
-              <a:rPr lang="en-US" sz="4000" dirty="0">
-                <a:solidFill>
-                  <a:srgbClr val="777777"/>
-                </a:solidFill>
-              </a:rPr>
-              <a:t>Sum of First N Numbers</a:t>
-            </a:r>
-          </a:p>
-          <a:p>
-            <a:pPr>
-              <a:buFont typeface="Arial" panose="020B0604020202020204" pitchFamily="34" charset="0"/>
-              <a:buChar char="•"/>
+              <a:rPr lang="en-US" sz="1200" dirty="0"/>
+              <a:t>Write a C program to find sum of all natural numbers between 1 to n using recursion.</a:t>
+            </a:r>
+          </a:p>
+          <a:p>
+            <a:pPr marL="457200" indent="-457200">
+              <a:buFont typeface="+mj-lt"/>
+              <a:buAutoNum type="arabicPeriod"/>
             </a:pPr>
             <a:r>
-              <a:rPr lang="en-US" sz="4000" dirty="0">
-                <a:solidFill>
-                  <a:srgbClr val="777777"/>
-                </a:solidFill>
-              </a:rPr>
-              <a:t>Sum of Digits</a:t>
-            </a:r>
-          </a:p>
-          <a:p>
-            <a:pPr>
-              <a:buFont typeface="Arial" panose="020B0604020202020204" pitchFamily="34" charset="0"/>
-              <a:buChar char="•"/>
+              <a:rPr lang="en-US" sz="1200" dirty="0"/>
+              <a:t>Write a C program to find sum of all even or odd numbers in given range using recursion.</a:t>
+            </a:r>
+          </a:p>
+          <a:p>
+            <a:pPr marL="457200" indent="-457200">
+              <a:buFont typeface="+mj-lt"/>
+              <a:buAutoNum type="arabicPeriod"/>
             </a:pPr>
             <a:r>
-              <a:rPr lang="en-US" sz="4000" dirty="0">
-                <a:solidFill>
-                  <a:srgbClr val="777777"/>
-                </a:solidFill>
-              </a:rPr>
-              <a:t>Palindrome</a:t>
-            </a:r>
-          </a:p>
-          <a:p>
-            <a:pPr>
-              <a:buFont typeface="Arial" panose="020B0604020202020204" pitchFamily="34" charset="0"/>
-              <a:buChar char="•"/>
+              <a:rPr lang="en-US" sz="1200" dirty="0"/>
+              <a:t>Write a C program to find reverse of any number and string using recursion.</a:t>
+            </a:r>
+          </a:p>
+          <a:p>
+            <a:pPr marL="457200" indent="-457200">
+              <a:buFont typeface="+mj-lt"/>
+              <a:buAutoNum type="arabicPeriod"/>
             </a:pPr>
             <a:r>
-              <a:rPr lang="en-US" sz="4000" dirty="0">
-                <a:solidFill>
-                  <a:srgbClr val="777777"/>
-                </a:solidFill>
-              </a:rPr>
-              <a:t>Power of N</a:t>
-            </a:r>
-          </a:p>
-          <a:p>
-            <a:pPr>
-              <a:buFont typeface="Arial" panose="020B0604020202020204" pitchFamily="34" charset="0"/>
-              <a:buChar char="•"/>
+              <a:rPr lang="en-US" sz="1200" dirty="0"/>
+              <a:t>Prime or Composite</a:t>
+            </a:r>
+          </a:p>
+          <a:p>
+            <a:pPr marL="0" indent="0">
+              <a:buNone/>
             </a:pPr>
-            <a:r>
-              <a:rPr lang="en-US" sz="4000" dirty="0">
-                <a:solidFill>
-                  <a:srgbClr val="777777"/>
-                </a:solidFill>
-              </a:rPr>
-              <a:t>Largest Array Element</a:t>
-            </a:r>
-          </a:p>
-          <a:p>
-            <a:pPr>
-              <a:buFont typeface="Arial" panose="020B0604020202020204" pitchFamily="34" charset="0"/>
-              <a:buChar char="•"/>
-            </a:pPr>
-            <a:r>
-              <a:rPr lang="en-US" sz="4000" dirty="0">
-                <a:solidFill>
-                  <a:srgbClr val="777777"/>
-                </a:solidFill>
-              </a:rPr>
-              <a:t>Prime or Composite</a:t>
-            </a:r>
-          </a:p>
-          <a:p>
-            <a:pPr>
-              <a:buFont typeface="Arial" panose="020B0604020202020204" pitchFamily="34" charset="0"/>
-              <a:buChar char="•"/>
-            </a:pPr>
-            <a:r>
-              <a:rPr lang="en-US" sz="4000" dirty="0">
-                <a:solidFill>
-                  <a:srgbClr val="777777"/>
-                </a:solidFill>
-              </a:rPr>
-              <a:t>LCM of Two Numbers</a:t>
-            </a:r>
-          </a:p>
-          <a:p>
-            <a:pPr>
-              <a:buFont typeface="Arial" panose="020B0604020202020204" pitchFamily="34" charset="0"/>
-              <a:buChar char="•"/>
-            </a:pPr>
-            <a:r>
-              <a:rPr lang="en-US" sz="4000" dirty="0">
-                <a:solidFill>
-                  <a:srgbClr val="777777"/>
-                </a:solidFill>
-              </a:rPr>
-              <a:t>GCD of Two Numbers</a:t>
-            </a:r>
-          </a:p>
-          <a:p>
-            <a:pPr>
-              <a:buFont typeface="Arial" panose="020B0604020202020204" pitchFamily="34" charset="0"/>
-              <a:buChar char="•"/>
-            </a:pPr>
-            <a:r>
-              <a:rPr lang="en-US" sz="4000" dirty="0">
-                <a:solidFill>
-                  <a:srgbClr val="777777"/>
-                </a:solidFill>
-              </a:rPr>
-              <a:t>Reverse a String</a:t>
-            </a:r>
+            <a:endParaRPr lang="en-US" sz="1200" dirty="0"/>
           </a:p>
           <a:p>
             <a:endParaRPr lang="en-CA" dirty="0"/>

</xml_diff>